<commit_message>
results with real data
</commit_message>
<xml_diff>
--- a/Manuscript/Resultados.pptx
+++ b/Manuscript/Resultados.pptx
@@ -5,8 +5,9 @@
     <p:sldMasterId id="2147483648" r:id="rId1"/>
   </p:sldMasterIdLst>
   <p:sldIdLst>
-    <p:sldId id="257" r:id="rId2"/>
-    <p:sldId id="258" r:id="rId3"/>
+    <p:sldId id="259" r:id="rId2"/>
+    <p:sldId id="257" r:id="rId3"/>
+    <p:sldId id="258" r:id="rId4"/>
   </p:sldIdLst>
   <p:sldSz cx="9144000" cy="6858000" type="screen4x3"/>
   <p:notesSz cx="6858000" cy="9144000"/>
@@ -3096,628 +3097,88 @@
           <a:chExt cx="0" cy="0"/>
         </a:xfrm>
       </p:grpSpPr>
-      <p:pic>
-        <p:nvPicPr>
-          <p:cNvPr id="2" name="Imagem 1"/>
-          <p:cNvPicPr>
-            <a:picLocks noChangeAspect="1"/>
-          </p:cNvPicPr>
-          <p:nvPr/>
-        </p:nvPicPr>
-        <p:blipFill rotWithShape="1">
-          <a:blip r:embed="rId2" cstate="print">
-            <a:extLst>
-              <a:ext uri="{28A0092B-C50C-407E-A947-70E740481C1C}">
-                <a14:useLocalDpi xmlns:a14="http://schemas.microsoft.com/office/drawing/2010/main" val="0"/>
-              </a:ext>
-            </a:extLst>
-          </a:blip>
-          <a:srcRect t="6183"/>
-          <a:stretch/>
-        </p:blipFill>
-        <p:spPr>
-          <a:xfrm>
-            <a:off x="35496" y="95622"/>
-            <a:ext cx="5760000" cy="3242320"/>
-          </a:xfrm>
-          <a:prstGeom prst="rect">
-            <a:avLst/>
-          </a:prstGeom>
-        </p:spPr>
-      </p:pic>
-      <p:pic>
-        <p:nvPicPr>
-          <p:cNvPr id="12" name="Imagem 11"/>
-          <p:cNvPicPr>
-            <a:picLocks noChangeAspect="1"/>
-          </p:cNvPicPr>
-          <p:nvPr/>
-        </p:nvPicPr>
-        <p:blipFill>
-          <a:blip r:embed="rId3" cstate="print">
-            <a:extLst>
-              <a:ext uri="{28A0092B-C50C-407E-A947-70E740481C1C}">
-                <a14:useLocalDpi xmlns:a14="http://schemas.microsoft.com/office/drawing/2010/main" val="0"/>
-              </a:ext>
-            </a:extLst>
-          </a:blip>
-          <a:stretch>
-            <a:fillRect/>
-          </a:stretch>
-        </p:blipFill>
-        <p:spPr>
-          <a:xfrm>
-            <a:off x="5364088" y="2493304"/>
-            <a:ext cx="3672000" cy="3672000"/>
-          </a:xfrm>
-          <a:prstGeom prst="rect">
-            <a:avLst/>
-          </a:prstGeom>
-        </p:spPr>
-      </p:pic>
-      <p:sp>
-        <p:nvSpPr>
-          <p:cNvPr id="3" name="CaixaDeTexto 2"/>
-          <p:cNvSpPr txBox="1"/>
-          <p:nvPr/>
-        </p:nvSpPr>
-        <p:spPr>
-          <a:xfrm>
-            <a:off x="5363776" y="1019637"/>
-            <a:ext cx="2952000" cy="1077218"/>
-          </a:xfrm>
-          <a:prstGeom prst="rect">
-            <a:avLst/>
-          </a:prstGeom>
-          <a:noFill/>
-        </p:spPr>
-        <p:txBody>
-          <a:bodyPr wrap="square" rtlCol="0">
-            <a:spAutoFit/>
+      <p:sp>
+        <p:nvSpPr>
+          <p:cNvPr id="2" name="Título 1"/>
+          <p:cNvSpPr>
+            <a:spLocks noGrp="1"/>
+          </p:cNvSpPr>
+          <p:nvPr>
+            <p:ph type="ctrTitle"/>
+          </p:nvPr>
+        </p:nvSpPr>
+        <p:spPr/>
+        <p:txBody>
+          <a:bodyPr>
+            <a:normAutofit fontScale="90000"/>
           </a:bodyPr>
           <a:lstStyle/>
           <a:p>
-            <a:pPr algn="ctr"/>
-            <a:r>
-              <a:rPr lang="pt-BR" sz="1600" dirty="0" smtClean="0">
-                <a:solidFill>
-                  <a:srgbClr val="FF0000"/>
-                </a:solidFill>
-              </a:rPr>
-              <a:t>Anomalia de campo total (TFA)</a:t>
-            </a:r>
-            <a:r>
-              <a:rPr lang="pt-BR" sz="1600" dirty="0" smtClean="0"/>
-              <a:t> produzida pelos corpos sintéticos (intrusão  + embasamento) sobre um </a:t>
-            </a:r>
-            <a:r>
-              <a:rPr lang="pt-BR" sz="1600" dirty="0" smtClean="0">
-                <a:solidFill>
-                  <a:srgbClr val="0000FF"/>
-                </a:solidFill>
-              </a:rPr>
-              <a:t>plano horizontal</a:t>
-            </a:r>
-            <a:endParaRPr lang="pt-BR" sz="1600" dirty="0" smtClean="0"/>
-          </a:p>
-        </p:txBody>
-      </p:sp>
-      <p:sp>
-        <p:nvSpPr>
-          <p:cNvPr id="7" name="Retângulo 6"/>
-          <p:cNvSpPr/>
-          <p:nvPr/>
-        </p:nvSpPr>
-        <p:spPr>
-          <a:xfrm>
-            <a:off x="1691680" y="32306"/>
-            <a:ext cx="2592288" cy="178532"/>
-          </a:xfrm>
-          <a:prstGeom prst="rect">
-            <a:avLst/>
-          </a:prstGeom>
-          <a:solidFill>
-            <a:schemeClr val="bg1"/>
-          </a:solidFill>
-          <a:ln>
-            <a:noFill/>
-          </a:ln>
-        </p:spPr>
-        <p:style>
-          <a:lnRef idx="2">
-            <a:schemeClr val="accent1">
-              <a:shade val="50000"/>
-            </a:schemeClr>
-          </a:lnRef>
-          <a:fillRef idx="1">
-            <a:schemeClr val="accent1"/>
-          </a:fillRef>
-          <a:effectRef idx="0">
-            <a:schemeClr val="accent1"/>
-          </a:effectRef>
-          <a:fontRef idx="minor">
-            <a:schemeClr val="lt1"/>
-          </a:fontRef>
-        </p:style>
-        <p:txBody>
-          <a:bodyPr rtlCol="0" anchor="ctr"/>
-          <a:lstStyle/>
-          <a:p>
-            <a:pPr algn="ctr"/>
-            <a:endParaRPr lang="pt-BR"/>
-          </a:p>
-        </p:txBody>
-      </p:sp>
-      <p:pic>
-        <p:nvPicPr>
-          <p:cNvPr id="6" name="Imagem 5"/>
-          <p:cNvPicPr>
-            <a:picLocks noChangeAspect="1"/>
-          </p:cNvPicPr>
-          <p:nvPr/>
-        </p:nvPicPr>
-        <p:blipFill rotWithShape="1">
-          <a:blip r:embed="rId4" cstate="print">
-            <a:extLst>
-              <a:ext uri="{28A0092B-C50C-407E-A947-70E740481C1C}">
-                <a14:useLocalDpi xmlns:a14="http://schemas.microsoft.com/office/drawing/2010/main" val="0"/>
-              </a:ext>
-            </a:extLst>
-          </a:blip>
-          <a:srcRect l="17867" t="21203" r="3846" b="7723"/>
-          <a:stretch/>
-        </p:blipFill>
-        <p:spPr>
-          <a:xfrm>
-            <a:off x="683568" y="4410212"/>
-            <a:ext cx="3600000" cy="2310662"/>
-          </a:xfrm>
-          <a:prstGeom prst="rect">
-            <a:avLst/>
-          </a:prstGeom>
-        </p:spPr>
-      </p:pic>
-      <p:sp>
-        <p:nvSpPr>
-          <p:cNvPr id="14" name="CaixaDeTexto 13"/>
-          <p:cNvSpPr txBox="1"/>
-          <p:nvPr/>
-        </p:nvSpPr>
-        <p:spPr>
-          <a:xfrm>
-            <a:off x="70140" y="3740763"/>
-            <a:ext cx="4357844" cy="624341"/>
-          </a:xfrm>
-          <a:prstGeom prst="rect">
-            <a:avLst/>
-          </a:prstGeom>
-          <a:noFill/>
-        </p:spPr>
-        <p:txBody>
-          <a:bodyPr wrap="square" rtlCol="0">
-            <a:spAutoFit/>
+            <a:r>
+              <a:rPr lang="pt-BR" dirty="0" smtClean="0"/>
+              <a:t>Determinação da direção de magnetização de corpo geológicos</a:t>
+            </a:r>
+            <a:endParaRPr lang="pt-BR" dirty="0"/>
+          </a:p>
+        </p:txBody>
+      </p:sp>
+      <p:sp>
+        <p:nvSpPr>
+          <p:cNvPr id="3" name="Subtítulo 2"/>
+          <p:cNvSpPr>
+            <a:spLocks noGrp="1"/>
+          </p:cNvSpPr>
+          <p:nvPr>
+            <p:ph type="subTitle" idx="1"/>
+          </p:nvPr>
+        </p:nvSpPr>
+        <p:spPr/>
+        <p:txBody>
+          <a:bodyPr>
+            <a:normAutofit fontScale="85000" lnSpcReduction="20000"/>
           </a:bodyPr>
           <a:lstStyle/>
           <a:p>
-            <a:pPr algn="ctr"/>
-            <a:r>
-              <a:rPr lang="pt-BR" sz="1600" dirty="0" smtClean="0"/>
-              <a:t>Estimativa da posição (ponto preto) da intrusão (azul transparente) via </a:t>
-            </a:r>
-            <a:r>
-              <a:rPr lang="pt-BR" sz="1600" dirty="0" err="1" smtClean="0"/>
-              <a:t>deconvolução</a:t>
-            </a:r>
-            <a:r>
-              <a:rPr lang="pt-BR" sz="1600" dirty="0" smtClean="0"/>
-              <a:t> de Euler </a:t>
-            </a:r>
-          </a:p>
-        </p:txBody>
-      </p:sp>
-      <p:sp>
-        <p:nvSpPr>
-          <p:cNvPr id="18" name="CaixaDeTexto 17"/>
-          <p:cNvSpPr txBox="1"/>
-          <p:nvPr/>
-        </p:nvSpPr>
-        <p:spPr>
-          <a:xfrm>
-            <a:off x="5363776" y="116632"/>
-            <a:ext cx="2952000" cy="830997"/>
-          </a:xfrm>
-          <a:prstGeom prst="rect">
-            <a:avLst/>
-          </a:prstGeom>
-          <a:noFill/>
-        </p:spPr>
-        <p:txBody>
-          <a:bodyPr wrap="square" rtlCol="0">
-            <a:spAutoFit/>
-          </a:bodyPr>
-          <a:lstStyle/>
-          <a:p>
-            <a:pPr algn="ctr"/>
-            <a:r>
-              <a:rPr lang="pt-BR" sz="1600" dirty="0" smtClean="0"/>
-              <a:t>Seção vertical de um modelo 3D formado por uma intrusão e um embasamento sintéticos</a:t>
-            </a:r>
-            <a:endParaRPr lang="pt-BR" sz="1600" dirty="0"/>
-          </a:p>
-        </p:txBody>
-      </p:sp>
-      <p:sp>
-        <p:nvSpPr>
-          <p:cNvPr id="20" name="Elipse 19"/>
-          <p:cNvSpPr/>
-          <p:nvPr/>
-        </p:nvSpPr>
-        <p:spPr>
-          <a:xfrm>
-            <a:off x="7631366" y="5970546"/>
-            <a:ext cx="108000" cy="108000"/>
-          </a:xfrm>
-          <a:prstGeom prst="ellipse">
-            <a:avLst/>
-          </a:prstGeom>
-          <a:solidFill>
-            <a:schemeClr val="tx1"/>
-          </a:solidFill>
-          <a:ln>
-            <a:solidFill>
-              <a:schemeClr val="tx1"/>
-            </a:solidFill>
-          </a:ln>
-        </p:spPr>
-        <p:style>
-          <a:lnRef idx="2">
-            <a:schemeClr val="accent1">
-              <a:shade val="50000"/>
-            </a:schemeClr>
-          </a:lnRef>
-          <a:fillRef idx="1">
-            <a:schemeClr val="accent1"/>
-          </a:fillRef>
-          <a:effectRef idx="0">
-            <a:schemeClr val="accent1"/>
-          </a:effectRef>
-          <a:fontRef idx="minor">
-            <a:schemeClr val="lt1"/>
-          </a:fontRef>
-        </p:style>
-        <p:txBody>
-          <a:bodyPr rtlCol="0" anchor="ctr"/>
-          <a:lstStyle/>
-          <a:p>
-            <a:pPr algn="ctr"/>
-            <a:endParaRPr lang="pt-BR"/>
-          </a:p>
-        </p:txBody>
-      </p:sp>
-      <p:sp>
-        <p:nvSpPr>
-          <p:cNvPr id="21" name="CaixaDeTexto 20"/>
-          <p:cNvSpPr txBox="1"/>
-          <p:nvPr/>
-        </p:nvSpPr>
-        <p:spPr>
-          <a:xfrm>
-            <a:off x="7772367" y="5847796"/>
-            <a:ext cx="1090748" cy="338554"/>
-          </a:xfrm>
-          <a:prstGeom prst="rect">
-            <a:avLst/>
-          </a:prstGeom>
-          <a:noFill/>
-        </p:spPr>
-        <p:txBody>
-          <a:bodyPr wrap="none" rtlCol="0">
-            <a:spAutoFit/>
-          </a:bodyPr>
-          <a:lstStyle/>
-          <a:p>
-            <a:r>
-              <a:rPr lang="pt-BR" sz="1600" dirty="0" smtClean="0"/>
-              <a:t>Verdadeira</a:t>
-            </a:r>
-            <a:endParaRPr lang="pt-BR" sz="1600" dirty="0"/>
-          </a:p>
-        </p:txBody>
-      </p:sp>
-      <p:sp>
-        <p:nvSpPr>
-          <p:cNvPr id="22" name="Retângulo 21"/>
-          <p:cNvSpPr/>
-          <p:nvPr/>
-        </p:nvSpPr>
-        <p:spPr>
-          <a:xfrm rot="2700000">
-            <a:off x="7631366" y="6254769"/>
-            <a:ext cx="108000" cy="108000"/>
-          </a:xfrm>
-          <a:prstGeom prst="rect">
-            <a:avLst/>
-          </a:prstGeom>
-          <a:solidFill>
-            <a:srgbClr val="FF0000"/>
-          </a:solidFill>
-          <a:ln>
-            <a:solidFill>
-              <a:srgbClr val="FF0000"/>
-            </a:solidFill>
-          </a:ln>
-        </p:spPr>
-        <p:style>
-          <a:lnRef idx="2">
-            <a:schemeClr val="accent1">
-              <a:shade val="50000"/>
-            </a:schemeClr>
-          </a:lnRef>
-          <a:fillRef idx="1">
-            <a:schemeClr val="accent1"/>
-          </a:fillRef>
-          <a:effectRef idx="0">
-            <a:schemeClr val="accent1"/>
-          </a:effectRef>
-          <a:fontRef idx="minor">
-            <a:schemeClr val="lt1"/>
-          </a:fontRef>
-        </p:style>
-        <p:txBody>
-          <a:bodyPr rtlCol="0" anchor="ctr"/>
-          <a:lstStyle/>
-          <a:p>
-            <a:pPr algn="ctr"/>
-            <a:endParaRPr lang="pt-BR"/>
-          </a:p>
-        </p:txBody>
-      </p:sp>
-      <p:sp>
-        <p:nvSpPr>
-          <p:cNvPr id="23" name="CaixaDeTexto 22"/>
-          <p:cNvSpPr txBox="1"/>
-          <p:nvPr/>
-        </p:nvSpPr>
-        <p:spPr>
-          <a:xfrm>
-            <a:off x="7772367" y="6125305"/>
-            <a:ext cx="1192121" cy="338554"/>
-          </a:xfrm>
-          <a:prstGeom prst="rect">
-            <a:avLst/>
-          </a:prstGeom>
-          <a:noFill/>
-        </p:spPr>
-        <p:txBody>
-          <a:bodyPr wrap="none" rtlCol="0">
-            <a:spAutoFit/>
-          </a:bodyPr>
-          <a:lstStyle/>
-          <a:p>
-            <a:r>
-              <a:rPr lang="pt-BR" sz="1600" dirty="0" smtClean="0">
-                <a:solidFill>
-                  <a:srgbClr val="FF0000"/>
-                </a:solidFill>
-              </a:rPr>
-              <a:t>Estimativa 1</a:t>
-            </a:r>
-            <a:endParaRPr lang="pt-BR" sz="1600" dirty="0">
-              <a:solidFill>
-                <a:srgbClr val="FF0000"/>
-              </a:solidFill>
-            </a:endParaRPr>
-          </a:p>
-        </p:txBody>
-      </p:sp>
-      <p:sp>
-        <p:nvSpPr>
-          <p:cNvPr id="24" name="Retângulo 23"/>
-          <p:cNvSpPr/>
-          <p:nvPr/>
-        </p:nvSpPr>
-        <p:spPr>
-          <a:xfrm>
-            <a:off x="7631366" y="6538992"/>
-            <a:ext cx="108000" cy="108000"/>
-          </a:xfrm>
-          <a:prstGeom prst="rect">
-            <a:avLst/>
-          </a:prstGeom>
-          <a:solidFill>
-            <a:srgbClr val="0000FF"/>
-          </a:solidFill>
-          <a:ln>
-            <a:solidFill>
-              <a:srgbClr val="0000FF"/>
-            </a:solidFill>
-          </a:ln>
-        </p:spPr>
-        <p:style>
-          <a:lnRef idx="2">
-            <a:schemeClr val="accent1">
-              <a:shade val="50000"/>
-            </a:schemeClr>
-          </a:lnRef>
-          <a:fillRef idx="1">
-            <a:schemeClr val="accent1"/>
-          </a:fillRef>
-          <a:effectRef idx="0">
-            <a:schemeClr val="accent1"/>
-          </a:effectRef>
-          <a:fontRef idx="minor">
-            <a:schemeClr val="lt1"/>
-          </a:fontRef>
-        </p:style>
-        <p:txBody>
-          <a:bodyPr rtlCol="0" anchor="ctr"/>
-          <a:lstStyle/>
-          <a:p>
-            <a:pPr algn="ctr"/>
-            <a:endParaRPr lang="pt-BR"/>
-          </a:p>
-        </p:txBody>
-      </p:sp>
-      <p:sp>
-        <p:nvSpPr>
-          <p:cNvPr id="25" name="CaixaDeTexto 24"/>
-          <p:cNvSpPr txBox="1"/>
-          <p:nvPr/>
-        </p:nvSpPr>
-        <p:spPr>
-          <a:xfrm>
-            <a:off x="7772367" y="6402814"/>
-            <a:ext cx="1192121" cy="338554"/>
-          </a:xfrm>
-          <a:prstGeom prst="rect">
-            <a:avLst/>
-          </a:prstGeom>
-          <a:noFill/>
-        </p:spPr>
-        <p:txBody>
-          <a:bodyPr wrap="none" rtlCol="0">
-            <a:spAutoFit/>
-          </a:bodyPr>
-          <a:lstStyle/>
-          <a:p>
-            <a:r>
-              <a:rPr lang="pt-BR" sz="1600" dirty="0" smtClean="0">
-                <a:solidFill>
-                  <a:srgbClr val="0000FF"/>
-                </a:solidFill>
-              </a:rPr>
-              <a:t>Estimativa 2</a:t>
-            </a:r>
-            <a:endParaRPr lang="pt-BR" sz="1600" dirty="0">
-              <a:solidFill>
-                <a:srgbClr val="0000FF"/>
-              </a:solidFill>
-            </a:endParaRPr>
-          </a:p>
-        </p:txBody>
-      </p:sp>
-      <p:sp>
-        <p:nvSpPr>
-          <p:cNvPr id="26" name="CaixaDeTexto 25"/>
-          <p:cNvSpPr txBox="1"/>
-          <p:nvPr/>
-        </p:nvSpPr>
-        <p:spPr>
-          <a:xfrm>
-            <a:off x="5508104" y="5877272"/>
-            <a:ext cx="1701604" cy="830997"/>
-          </a:xfrm>
-          <a:prstGeom prst="rect">
-            <a:avLst/>
-          </a:prstGeom>
-          <a:noFill/>
-        </p:spPr>
-        <p:txBody>
-          <a:bodyPr wrap="square" rtlCol="0">
-            <a:spAutoFit/>
-          </a:bodyPr>
-          <a:lstStyle/>
-          <a:p>
-            <a:pPr algn="ctr"/>
-            <a:r>
-              <a:rPr lang="pt-BR" sz="1600" dirty="0" smtClean="0"/>
-              <a:t>Direção da magnetização da intrusão</a:t>
-            </a:r>
-            <a:endParaRPr lang="pt-BR" sz="1600" dirty="0"/>
-          </a:p>
-        </p:txBody>
-      </p:sp>
-      <p:sp>
-        <p:nvSpPr>
-          <p:cNvPr id="27" name="CaixaDeTexto 26"/>
-          <p:cNvSpPr txBox="1"/>
-          <p:nvPr/>
-        </p:nvSpPr>
-        <p:spPr>
-          <a:xfrm>
-            <a:off x="7092280" y="3348281"/>
-            <a:ext cx="1701604" cy="584775"/>
-          </a:xfrm>
-          <a:prstGeom prst="rect">
-            <a:avLst/>
-          </a:prstGeom>
-          <a:noFill/>
-        </p:spPr>
-        <p:txBody>
-          <a:bodyPr wrap="square" rtlCol="0">
-            <a:spAutoFit/>
-          </a:bodyPr>
-          <a:lstStyle/>
-          <a:p>
-            <a:pPr algn="ctr"/>
-            <a:r>
-              <a:rPr lang="pt-BR" sz="1600" dirty="0" smtClean="0"/>
-              <a:t>Campo</a:t>
-            </a:r>
-          </a:p>
-          <a:p>
-            <a:pPr algn="ctr"/>
-            <a:r>
-              <a:rPr lang="pt-BR" sz="1600" dirty="0" smtClean="0"/>
-              <a:t>geomagnético</a:t>
-            </a:r>
-            <a:endParaRPr lang="pt-BR" sz="1600" dirty="0"/>
-          </a:p>
-        </p:txBody>
-      </p:sp>
-      <p:cxnSp>
-        <p:nvCxnSpPr>
-          <p:cNvPr id="29" name="Conector de seta reta 28"/>
-          <p:cNvCxnSpPr/>
-          <p:nvPr/>
-        </p:nvCxnSpPr>
-        <p:spPr>
-          <a:xfrm flipH="1" flipV="1">
-            <a:off x="6948264" y="3348282"/>
-            <a:ext cx="540536" cy="224734"/>
-          </a:xfrm>
-          <a:prstGeom prst="straightConnector1">
-            <a:avLst/>
-          </a:prstGeom>
-          <a:ln w="12700">
-            <a:solidFill>
-              <a:schemeClr val="tx1"/>
-            </a:solidFill>
-            <a:tailEnd type="arrow"/>
-          </a:ln>
-        </p:spPr>
-        <p:style>
-          <a:lnRef idx="1">
-            <a:schemeClr val="accent1"/>
-          </a:lnRef>
-          <a:fillRef idx="0">
-            <a:schemeClr val="accent1"/>
-          </a:fillRef>
-          <a:effectRef idx="0">
-            <a:schemeClr val="accent1"/>
-          </a:effectRef>
-          <a:fontRef idx="minor">
-            <a:schemeClr val="tx1"/>
-          </a:fontRef>
-        </p:style>
-      </p:cxnSp>
+            <a:r>
+              <a:rPr lang="pt-BR" dirty="0" smtClean="0"/>
+              <a:t>Vanderlei C. Oliveira Jr.</a:t>
+            </a:r>
+          </a:p>
+          <a:p>
+            <a:r>
+              <a:rPr lang="pt-BR" dirty="0" smtClean="0"/>
+              <a:t>Daiana P. Sales</a:t>
+            </a:r>
+          </a:p>
+          <a:p>
+            <a:r>
+              <a:rPr lang="pt-BR" dirty="0" smtClean="0"/>
+              <a:t>Valéria C. F. Barbosa</a:t>
+            </a:r>
+          </a:p>
+          <a:p>
+            <a:r>
+              <a:rPr lang="pt-BR" dirty="0" smtClean="0"/>
+              <a:t>Leonardo </a:t>
+            </a:r>
+            <a:r>
+              <a:rPr lang="pt-BR" dirty="0" err="1" smtClean="0"/>
+              <a:t>Uieda</a:t>
+            </a:r>
+            <a:endParaRPr lang="pt-BR" dirty="0"/>
+          </a:p>
+        </p:txBody>
+      </p:sp>
     </p:spTree>
     <p:extLst>
       <p:ext uri="{BB962C8B-B14F-4D97-AF65-F5344CB8AC3E}">
-        <p14:creationId xmlns:p14="http://schemas.microsoft.com/office/powerpoint/2010/main" val="354068467"/>
+        <p14:creationId xmlns:p14="http://schemas.microsoft.com/office/powerpoint/2010/main" val="1150169677"/>
       </p:ext>
     </p:extLst>
   </p:cSld>
   <p:clrMapOvr>
     <a:masterClrMapping/>
   </p:clrMapOvr>
-  <p:timing>
-    <p:tnLst>
-      <p:par>
-        <p:cTn id="1" dur="indefinite" restart="never" nodeType="tmRoot"/>
-      </p:par>
-    </p:tnLst>
-  </p:timing>
 </p:sld>
 </file>
 
@@ -3740,7 +3201,7 @@
       </p:grpSpPr>
       <p:pic>
         <p:nvPicPr>
-          <p:cNvPr id="9" name="Imagem 8"/>
+          <p:cNvPr id="2" name="Imagem 1"/>
           <p:cNvPicPr>
             <a:picLocks noChangeAspect="1"/>
           </p:cNvPicPr>
@@ -3754,29 +3215,59 @@
               </a:ext>
             </a:extLst>
           </a:blip>
-          <a:srcRect t="2014" b="5870"/>
+          <a:srcRect t="6183"/>
           <a:stretch/>
         </p:blipFill>
         <p:spPr>
           <a:xfrm>
-            <a:off x="5832504" y="3723663"/>
-            <a:ext cx="3276000" cy="3017705"/>
+            <a:off x="35496" y="474712"/>
+            <a:ext cx="5760000" cy="3242320"/>
           </a:xfrm>
           <a:prstGeom prst="rect">
             <a:avLst/>
           </a:prstGeom>
         </p:spPr>
       </p:pic>
-      <p:sp>
-        <p:nvSpPr>
-          <p:cNvPr id="23" name="CaixaDeTexto 22"/>
+      <p:pic>
+        <p:nvPicPr>
+          <p:cNvPr id="12" name="Imagem 11"/>
+          <p:cNvPicPr>
+            <a:picLocks noChangeAspect="1"/>
+          </p:cNvPicPr>
+          <p:nvPr/>
+        </p:nvPicPr>
+        <p:blipFill>
+          <a:blip r:embed="rId3" cstate="print">
+            <a:extLst>
+              <a:ext uri="{28A0092B-C50C-407E-A947-70E740481C1C}">
+                <a14:useLocalDpi xmlns:a14="http://schemas.microsoft.com/office/drawing/2010/main" val="0"/>
+              </a:ext>
+            </a:extLst>
+          </a:blip>
+          <a:stretch>
+            <a:fillRect/>
+          </a:stretch>
+        </p:blipFill>
+        <p:spPr>
+          <a:xfrm>
+            <a:off x="5364088" y="2493304"/>
+            <a:ext cx="3672000" cy="3672000"/>
+          </a:xfrm>
+          <a:prstGeom prst="rect">
+            <a:avLst/>
+          </a:prstGeom>
+        </p:spPr>
+      </p:pic>
+      <p:sp>
+        <p:nvSpPr>
+          <p:cNvPr id="3" name="CaixaDeTexto 2"/>
           <p:cNvSpPr txBox="1"/>
           <p:nvPr/>
         </p:nvSpPr>
         <p:spPr>
           <a:xfrm>
-            <a:off x="5023401" y="5811895"/>
-            <a:ext cx="1374094" cy="338554"/>
+            <a:off x="5363776" y="1019637"/>
+            <a:ext cx="2952000" cy="1077218"/>
           </a:xfrm>
           <a:prstGeom prst="rect">
             <a:avLst/>
@@ -3784,38 +3275,55 @@
           <a:noFill/>
         </p:spPr>
         <p:txBody>
-          <a:bodyPr wrap="none" rtlCol="0">
+          <a:bodyPr wrap="square" rtlCol="0">
             <a:spAutoFit/>
           </a:bodyPr>
           <a:lstStyle/>
           <a:p>
+            <a:pPr algn="ctr"/>
+            <a:r>
+              <a:rPr lang="pt-BR" sz="1600" dirty="0" smtClean="0">
+                <a:solidFill>
+                  <a:srgbClr val="FF0000"/>
+                </a:solidFill>
+              </a:rPr>
+              <a:t>Anomalia de campo total (TFA)</a:t>
+            </a:r>
             <a:r>
               <a:rPr lang="pt-BR" sz="1600" dirty="0" smtClean="0"/>
-              <a:t>Campo Geom.</a:t>
-            </a:r>
-            <a:endParaRPr lang="pt-BR" sz="1600" dirty="0"/>
-          </a:p>
-        </p:txBody>
-      </p:sp>
-      <p:sp>
-        <p:nvSpPr>
-          <p:cNvPr id="24" name="Retângulo 23"/>
+              <a:t> produzida pelos corpos sintéticos (intrusão  + embasamento) sobre um </a:t>
+            </a:r>
+            <a:r>
+              <a:rPr lang="pt-BR" sz="1600" dirty="0" smtClean="0">
+                <a:solidFill>
+                  <a:srgbClr val="0000FF"/>
+                </a:solidFill>
+              </a:rPr>
+              <a:t>plano horizontal</a:t>
+            </a:r>
+            <a:endParaRPr lang="pt-BR" sz="1600" dirty="0" smtClean="0"/>
+          </a:p>
+        </p:txBody>
+      </p:sp>
+      <p:sp>
+        <p:nvSpPr>
+          <p:cNvPr id="7" name="Retângulo 6"/>
           <p:cNvSpPr/>
           <p:nvPr/>
         </p:nvSpPr>
         <p:spPr>
-          <a:xfrm rot="2700000">
-            <a:off x="4882400" y="6218868"/>
-            <a:ext cx="108000" cy="108000"/>
+          <a:xfrm>
+            <a:off x="1691680" y="399026"/>
+            <a:ext cx="2592288" cy="178532"/>
           </a:xfrm>
           <a:prstGeom prst="rect">
             <a:avLst/>
           </a:prstGeom>
-          <a:noFill/>
+          <a:solidFill>
+            <a:schemeClr val="bg1"/>
+          </a:solidFill>
           <a:ln>
-            <a:solidFill>
-              <a:srgbClr val="FF0000"/>
-            </a:solidFill>
+            <a:noFill/>
           </a:ln>
         </p:spPr>
         <p:style>
@@ -3843,16 +3351,45 @@
           </a:p>
         </p:txBody>
       </p:sp>
-      <p:sp>
-        <p:nvSpPr>
-          <p:cNvPr id="25" name="CaixaDeTexto 24"/>
+      <p:pic>
+        <p:nvPicPr>
+          <p:cNvPr id="6" name="Imagem 5"/>
+          <p:cNvPicPr>
+            <a:picLocks noChangeAspect="1"/>
+          </p:cNvPicPr>
+          <p:nvPr/>
+        </p:nvPicPr>
+        <p:blipFill rotWithShape="1">
+          <a:blip r:embed="rId4" cstate="print">
+            <a:extLst>
+              <a:ext uri="{28A0092B-C50C-407E-A947-70E740481C1C}">
+                <a14:useLocalDpi xmlns:a14="http://schemas.microsoft.com/office/drawing/2010/main" val="0"/>
+              </a:ext>
+            </a:extLst>
+          </a:blip>
+          <a:srcRect l="17867" t="21203" r="3846" b="7723"/>
+          <a:stretch/>
+        </p:blipFill>
+        <p:spPr>
+          <a:xfrm>
+            <a:off x="683568" y="4410212"/>
+            <a:ext cx="3600000" cy="2310662"/>
+          </a:xfrm>
+          <a:prstGeom prst="rect">
+            <a:avLst/>
+          </a:prstGeom>
+        </p:spPr>
+      </p:pic>
+      <p:sp>
+        <p:nvSpPr>
+          <p:cNvPr id="14" name="CaixaDeTexto 13"/>
           <p:cNvSpPr txBox="1"/>
           <p:nvPr/>
         </p:nvSpPr>
         <p:spPr>
           <a:xfrm>
-            <a:off x="5023401" y="6089404"/>
-            <a:ext cx="1192121" cy="338554"/>
+            <a:off x="70140" y="3740763"/>
+            <a:ext cx="4357844" cy="624341"/>
           </a:xfrm>
           <a:prstGeom prst="rect">
             <a:avLst/>
@@ -3860,45 +3397,78 @@
           <a:noFill/>
         </p:spPr>
         <p:txBody>
-          <a:bodyPr wrap="none" rtlCol="0">
+          <a:bodyPr wrap="square" rtlCol="0">
             <a:spAutoFit/>
           </a:bodyPr>
           <a:lstStyle/>
           <a:p>
-            <a:r>
-              <a:rPr lang="pt-BR" sz="1600" dirty="0" smtClean="0">
-                <a:solidFill>
-                  <a:srgbClr val="FF0000"/>
-                </a:solidFill>
-              </a:rPr>
-              <a:t>Estimativa 1</a:t>
-            </a:r>
-            <a:endParaRPr lang="pt-BR" sz="1600" dirty="0">
-              <a:solidFill>
-                <a:srgbClr val="FF0000"/>
-              </a:solidFill>
-            </a:endParaRPr>
-          </a:p>
-        </p:txBody>
-      </p:sp>
-      <p:sp>
-        <p:nvSpPr>
-          <p:cNvPr id="26" name="Retângulo 25"/>
-          <p:cNvSpPr/>
+            <a:pPr algn="ctr"/>
+            <a:r>
+              <a:rPr lang="pt-BR" sz="1600" dirty="0" smtClean="0"/>
+              <a:t>Estimativa da posição (ponto preto) da intrusão (azul transparente) via </a:t>
+            </a:r>
+            <a:r>
+              <a:rPr lang="pt-BR" sz="1600" dirty="0" err="1" smtClean="0"/>
+              <a:t>deconvolução</a:t>
+            </a:r>
+            <a:r>
+              <a:rPr lang="pt-BR" sz="1600" dirty="0" smtClean="0"/>
+              <a:t> de Euler </a:t>
+            </a:r>
+          </a:p>
+        </p:txBody>
+      </p:sp>
+      <p:sp>
+        <p:nvSpPr>
+          <p:cNvPr id="18" name="CaixaDeTexto 17"/>
+          <p:cNvSpPr txBox="1"/>
           <p:nvPr/>
         </p:nvSpPr>
         <p:spPr>
           <a:xfrm>
-            <a:off x="4882400" y="6503091"/>
-            <a:ext cx="108000" cy="108000"/>
+            <a:off x="5363776" y="116632"/>
+            <a:ext cx="2952000" cy="830997"/>
           </a:xfrm>
           <a:prstGeom prst="rect">
             <a:avLst/>
           </a:prstGeom>
           <a:noFill/>
+        </p:spPr>
+        <p:txBody>
+          <a:bodyPr wrap="square" rtlCol="0">
+            <a:spAutoFit/>
+          </a:bodyPr>
+          <a:lstStyle/>
+          <a:p>
+            <a:pPr algn="ctr"/>
+            <a:r>
+              <a:rPr lang="pt-BR" sz="1600" dirty="0" smtClean="0"/>
+              <a:t>Seção vertical de um modelo 3D formado por uma intrusão e um embasamento sintéticos</a:t>
+            </a:r>
+            <a:endParaRPr lang="pt-BR" sz="1600" dirty="0"/>
+          </a:p>
+        </p:txBody>
+      </p:sp>
+      <p:sp>
+        <p:nvSpPr>
+          <p:cNvPr id="20" name="Elipse 19"/>
+          <p:cNvSpPr/>
+          <p:nvPr/>
+        </p:nvSpPr>
+        <p:spPr>
+          <a:xfrm>
+            <a:off x="7631366" y="5970546"/>
+            <a:ext cx="108000" cy="108000"/>
+          </a:xfrm>
+          <a:prstGeom prst="ellipse">
+            <a:avLst/>
+          </a:prstGeom>
+          <a:solidFill>
+            <a:schemeClr val="tx1"/>
+          </a:solidFill>
           <a:ln>
             <a:solidFill>
-              <a:srgbClr val="0000FF"/>
+              <a:schemeClr val="tx1"/>
             </a:solidFill>
           </a:ln>
         </p:spPr>
@@ -3929,14 +3499,14 @@
       </p:sp>
       <p:sp>
         <p:nvSpPr>
-          <p:cNvPr id="27" name="CaixaDeTexto 26"/>
+          <p:cNvPr id="21" name="CaixaDeTexto 20"/>
           <p:cNvSpPr txBox="1"/>
           <p:nvPr/>
         </p:nvSpPr>
         <p:spPr>
           <a:xfrm>
-            <a:off x="5023401" y="6366913"/>
-            <a:ext cx="1192121" cy="338554"/>
+            <a:off x="7772367" y="5847796"/>
+            <a:ext cx="1090748" cy="338554"/>
           </a:xfrm>
           <a:prstGeom prst="rect">
             <a:avLst/>
@@ -3950,39 +3520,33 @@
           <a:lstStyle/>
           <a:p>
             <a:r>
-              <a:rPr lang="pt-BR" sz="1600" dirty="0" smtClean="0">
-                <a:solidFill>
-                  <a:srgbClr val="0000FF"/>
-                </a:solidFill>
-              </a:rPr>
-              <a:t>Estimativa 2</a:t>
-            </a:r>
-            <a:endParaRPr lang="pt-BR" sz="1600" dirty="0">
-              <a:solidFill>
-                <a:srgbClr val="0000FF"/>
-              </a:solidFill>
-            </a:endParaRPr>
-          </a:p>
-        </p:txBody>
-      </p:sp>
-      <p:sp>
-        <p:nvSpPr>
-          <p:cNvPr id="29" name="Triângulo isósceles 28"/>
+              <a:rPr lang="pt-BR" sz="1600" dirty="0" smtClean="0"/>
+              <a:t>Verdadeira</a:t>
+            </a:r>
+            <a:endParaRPr lang="pt-BR" sz="1600" dirty="0"/>
+          </a:p>
+        </p:txBody>
+      </p:sp>
+      <p:sp>
+        <p:nvSpPr>
+          <p:cNvPr id="22" name="Retângulo 21"/>
           <p:cNvSpPr/>
           <p:nvPr/>
         </p:nvSpPr>
         <p:spPr>
-          <a:xfrm>
-            <a:off x="4876630" y="5927450"/>
+          <a:xfrm rot="2700000">
+            <a:off x="7631366" y="6254769"/>
             <a:ext cx="108000" cy="108000"/>
           </a:xfrm>
-          <a:prstGeom prst="triangle">
+          <a:prstGeom prst="rect">
             <a:avLst/>
           </a:prstGeom>
-          <a:noFill/>
+          <a:solidFill>
+            <a:srgbClr val="FF0000"/>
+          </a:solidFill>
           <a:ln>
             <a:solidFill>
-              <a:schemeClr val="tx1"/>
+              <a:srgbClr val="FF0000"/>
             </a:solidFill>
           </a:ln>
         </p:spPr>
@@ -4011,9 +3575,441 @@
           </a:p>
         </p:txBody>
       </p:sp>
+      <p:sp>
+        <p:nvSpPr>
+          <p:cNvPr id="23" name="CaixaDeTexto 22"/>
+          <p:cNvSpPr txBox="1"/>
+          <p:nvPr/>
+        </p:nvSpPr>
+        <p:spPr>
+          <a:xfrm>
+            <a:off x="7772367" y="6125305"/>
+            <a:ext cx="1192121" cy="338554"/>
+          </a:xfrm>
+          <a:prstGeom prst="rect">
+            <a:avLst/>
+          </a:prstGeom>
+          <a:noFill/>
+        </p:spPr>
+        <p:txBody>
+          <a:bodyPr wrap="none" rtlCol="0">
+            <a:spAutoFit/>
+          </a:bodyPr>
+          <a:lstStyle/>
+          <a:p>
+            <a:r>
+              <a:rPr lang="pt-BR" sz="1600" dirty="0" smtClean="0">
+                <a:solidFill>
+                  <a:srgbClr val="FF0000"/>
+                </a:solidFill>
+              </a:rPr>
+              <a:t>Estimativa 1</a:t>
+            </a:r>
+            <a:endParaRPr lang="pt-BR" sz="1600" dirty="0">
+              <a:solidFill>
+                <a:srgbClr val="FF0000"/>
+              </a:solidFill>
+            </a:endParaRPr>
+          </a:p>
+        </p:txBody>
+      </p:sp>
+      <p:sp>
+        <p:nvSpPr>
+          <p:cNvPr id="24" name="Retângulo 23"/>
+          <p:cNvSpPr/>
+          <p:nvPr/>
+        </p:nvSpPr>
+        <p:spPr>
+          <a:xfrm>
+            <a:off x="7631366" y="6538992"/>
+            <a:ext cx="108000" cy="108000"/>
+          </a:xfrm>
+          <a:prstGeom prst="rect">
+            <a:avLst/>
+          </a:prstGeom>
+          <a:solidFill>
+            <a:srgbClr val="0000FF"/>
+          </a:solidFill>
+          <a:ln>
+            <a:solidFill>
+              <a:srgbClr val="0000FF"/>
+            </a:solidFill>
+          </a:ln>
+        </p:spPr>
+        <p:style>
+          <a:lnRef idx="2">
+            <a:schemeClr val="accent1">
+              <a:shade val="50000"/>
+            </a:schemeClr>
+          </a:lnRef>
+          <a:fillRef idx="1">
+            <a:schemeClr val="accent1"/>
+          </a:fillRef>
+          <a:effectRef idx="0">
+            <a:schemeClr val="accent1"/>
+          </a:effectRef>
+          <a:fontRef idx="minor">
+            <a:schemeClr val="lt1"/>
+          </a:fontRef>
+        </p:style>
+        <p:txBody>
+          <a:bodyPr rtlCol="0" anchor="ctr"/>
+          <a:lstStyle/>
+          <a:p>
+            <a:pPr algn="ctr"/>
+            <a:endParaRPr lang="pt-BR"/>
+          </a:p>
+        </p:txBody>
+      </p:sp>
+      <p:sp>
+        <p:nvSpPr>
+          <p:cNvPr id="25" name="CaixaDeTexto 24"/>
+          <p:cNvSpPr txBox="1"/>
+          <p:nvPr/>
+        </p:nvSpPr>
+        <p:spPr>
+          <a:xfrm>
+            <a:off x="7772367" y="6402814"/>
+            <a:ext cx="1192121" cy="338554"/>
+          </a:xfrm>
+          <a:prstGeom prst="rect">
+            <a:avLst/>
+          </a:prstGeom>
+          <a:noFill/>
+        </p:spPr>
+        <p:txBody>
+          <a:bodyPr wrap="none" rtlCol="0">
+            <a:spAutoFit/>
+          </a:bodyPr>
+          <a:lstStyle/>
+          <a:p>
+            <a:r>
+              <a:rPr lang="pt-BR" sz="1600" dirty="0" smtClean="0">
+                <a:solidFill>
+                  <a:srgbClr val="0000FF"/>
+                </a:solidFill>
+              </a:rPr>
+              <a:t>Estimativa 2</a:t>
+            </a:r>
+            <a:endParaRPr lang="pt-BR" sz="1600" dirty="0">
+              <a:solidFill>
+                <a:srgbClr val="0000FF"/>
+              </a:solidFill>
+            </a:endParaRPr>
+          </a:p>
+        </p:txBody>
+      </p:sp>
+      <p:sp>
+        <p:nvSpPr>
+          <p:cNvPr id="26" name="CaixaDeTexto 25"/>
+          <p:cNvSpPr txBox="1"/>
+          <p:nvPr/>
+        </p:nvSpPr>
+        <p:spPr>
+          <a:xfrm>
+            <a:off x="5508104" y="5877272"/>
+            <a:ext cx="1701604" cy="830997"/>
+          </a:xfrm>
+          <a:prstGeom prst="rect">
+            <a:avLst/>
+          </a:prstGeom>
+          <a:noFill/>
+        </p:spPr>
+        <p:txBody>
+          <a:bodyPr wrap="square" rtlCol="0">
+            <a:spAutoFit/>
+          </a:bodyPr>
+          <a:lstStyle/>
+          <a:p>
+            <a:pPr algn="ctr"/>
+            <a:r>
+              <a:rPr lang="pt-BR" sz="1600" dirty="0" smtClean="0"/>
+              <a:t>Direção da magnetização da intrusão</a:t>
+            </a:r>
+            <a:endParaRPr lang="pt-BR" sz="1600" dirty="0"/>
+          </a:p>
+        </p:txBody>
+      </p:sp>
+      <p:sp>
+        <p:nvSpPr>
+          <p:cNvPr id="27" name="CaixaDeTexto 26"/>
+          <p:cNvSpPr txBox="1"/>
+          <p:nvPr/>
+        </p:nvSpPr>
+        <p:spPr>
+          <a:xfrm>
+            <a:off x="7092280" y="3348281"/>
+            <a:ext cx="1701604" cy="584775"/>
+          </a:xfrm>
+          <a:prstGeom prst="rect">
+            <a:avLst/>
+          </a:prstGeom>
+          <a:noFill/>
+        </p:spPr>
+        <p:txBody>
+          <a:bodyPr wrap="square" rtlCol="0">
+            <a:spAutoFit/>
+          </a:bodyPr>
+          <a:lstStyle/>
+          <a:p>
+            <a:pPr algn="ctr"/>
+            <a:r>
+              <a:rPr lang="pt-BR" sz="1600" dirty="0" smtClean="0"/>
+              <a:t>Campo</a:t>
+            </a:r>
+          </a:p>
+          <a:p>
+            <a:pPr algn="ctr"/>
+            <a:r>
+              <a:rPr lang="pt-BR" sz="1600" dirty="0" smtClean="0"/>
+              <a:t>geomagnético</a:t>
+            </a:r>
+            <a:endParaRPr lang="pt-BR" sz="1600" dirty="0"/>
+          </a:p>
+        </p:txBody>
+      </p:sp>
+      <p:cxnSp>
+        <p:nvCxnSpPr>
+          <p:cNvPr id="29" name="Conector de seta reta 28"/>
+          <p:cNvCxnSpPr/>
+          <p:nvPr/>
+        </p:nvCxnSpPr>
+        <p:spPr>
+          <a:xfrm flipH="1" flipV="1">
+            <a:off x="6948264" y="3348282"/>
+            <a:ext cx="540536" cy="224734"/>
+          </a:xfrm>
+          <a:prstGeom prst="straightConnector1">
+            <a:avLst/>
+          </a:prstGeom>
+          <a:ln w="12700">
+            <a:solidFill>
+              <a:schemeClr val="tx1"/>
+            </a:solidFill>
+            <a:tailEnd type="arrow"/>
+          </a:ln>
+        </p:spPr>
+        <p:style>
+          <a:lnRef idx="1">
+            <a:schemeClr val="accent1"/>
+          </a:lnRef>
+          <a:fillRef idx="0">
+            <a:schemeClr val="accent1"/>
+          </a:fillRef>
+          <a:effectRef idx="0">
+            <a:schemeClr val="accent1"/>
+          </a:effectRef>
+          <a:fontRef idx="minor">
+            <a:schemeClr val="tx1"/>
+          </a:fontRef>
+        </p:style>
+      </p:cxnSp>
+      <p:sp>
+        <p:nvSpPr>
+          <p:cNvPr id="19" name="CaixaDeTexto 18"/>
+          <p:cNvSpPr txBox="1"/>
+          <p:nvPr/>
+        </p:nvSpPr>
+        <p:spPr>
+          <a:xfrm>
+            <a:off x="119130" y="41355"/>
+            <a:ext cx="3909063" cy="369332"/>
+          </a:xfrm>
+          <a:prstGeom prst="rect">
+            <a:avLst/>
+          </a:prstGeom>
+          <a:noFill/>
+        </p:spPr>
+        <p:txBody>
+          <a:bodyPr wrap="square" rtlCol="0">
+            <a:spAutoFit/>
+          </a:bodyPr>
+          <a:lstStyle/>
+          <a:p>
+            <a:r>
+              <a:rPr lang="pt-BR" dirty="0" smtClean="0"/>
+              <a:t>Aplicação a dados sintéticos</a:t>
+            </a:r>
+            <a:endParaRPr lang="pt-BR" dirty="0"/>
+          </a:p>
+        </p:txBody>
+      </p:sp>
+    </p:spTree>
+    <p:extLst>
+      <p:ext uri="{BB962C8B-B14F-4D97-AF65-F5344CB8AC3E}">
+        <p14:creationId xmlns:p14="http://schemas.microsoft.com/office/powerpoint/2010/main" val="354068467"/>
+      </p:ext>
+    </p:extLst>
+  </p:cSld>
+  <p:clrMapOvr>
+    <a:masterClrMapping/>
+  </p:clrMapOvr>
+  <p:timing>
+    <p:tnLst>
+      <p:par>
+        <p:cTn id="1" dur="indefinite" restart="never" nodeType="tmRoot"/>
+      </p:par>
+    </p:tnLst>
+  </p:timing>
+</p:sld>
+</file>
+
+<file path=ppt/slides/slide3.xml><?xml version="1.0" encoding="utf-8"?>
+<p:sld xmlns:a="http://schemas.openxmlformats.org/drawingml/2006/main" xmlns:r="http://schemas.openxmlformats.org/officeDocument/2006/relationships" xmlns:p="http://schemas.openxmlformats.org/presentationml/2006/main">
+  <p:cSld>
+    <p:spTree>
+      <p:nvGrpSpPr>
+        <p:cNvPr id="1" name=""/>
+        <p:cNvGrpSpPr/>
+        <p:nvPr/>
+      </p:nvGrpSpPr>
+      <p:grpSpPr>
+        <a:xfrm>
+          <a:off x="0" y="0"/>
+          <a:ext cx="0" cy="0"/>
+          <a:chOff x="0" y="0"/>
+          <a:chExt cx="0" cy="0"/>
+        </a:xfrm>
+      </p:grpSpPr>
+      <p:grpSp>
+        <p:nvGrpSpPr>
+          <p:cNvPr id="11" name="Grupo 10"/>
+          <p:cNvGrpSpPr/>
+          <p:nvPr/>
+        </p:nvGrpSpPr>
+        <p:grpSpPr>
+          <a:xfrm>
+            <a:off x="35496" y="480622"/>
+            <a:ext cx="4032000" cy="2876370"/>
+            <a:chOff x="35496" y="407858"/>
+            <a:chExt cx="4032000" cy="2876370"/>
+          </a:xfrm>
+        </p:grpSpPr>
+        <p:pic>
+          <p:nvPicPr>
+            <p:cNvPr id="2" name="Imagem 1"/>
+            <p:cNvPicPr>
+              <a:picLocks noChangeAspect="1"/>
+            </p:cNvPicPr>
+            <p:nvPr/>
+          </p:nvPicPr>
+          <p:blipFill rotWithShape="1">
+            <a:blip r:embed="rId2" cstate="print">
+              <a:extLst>
+                <a:ext uri="{28A0092B-C50C-407E-A947-70E740481C1C}">
+                  <a14:useLocalDpi xmlns:a14="http://schemas.microsoft.com/office/drawing/2010/main" val="0"/>
+                </a:ext>
+              </a:extLst>
+            </a:blip>
+            <a:srcRect t="3376" b="4631"/>
+            <a:stretch/>
+          </p:blipFill>
+          <p:spPr>
+            <a:xfrm>
+              <a:off x="35496" y="407858"/>
+              <a:ext cx="4032000" cy="2876370"/>
+            </a:xfrm>
+            <a:prstGeom prst="rect">
+              <a:avLst/>
+            </a:prstGeom>
+          </p:spPr>
+        </p:pic>
+        <p:sp>
+          <p:nvSpPr>
+            <p:cNvPr id="13" name="Retângulo 12"/>
+            <p:cNvSpPr/>
+            <p:nvPr/>
+          </p:nvSpPr>
+          <p:spPr>
+            <a:xfrm>
+              <a:off x="1115616" y="823597"/>
+              <a:ext cx="576065" cy="404677"/>
+            </a:xfrm>
+            <a:prstGeom prst="rect">
+              <a:avLst/>
+            </a:prstGeom>
+            <a:noFill/>
+            <a:ln>
+              <a:solidFill>
+                <a:srgbClr val="0000FF"/>
+              </a:solidFill>
+            </a:ln>
+          </p:spPr>
+          <p:style>
+            <a:lnRef idx="2">
+              <a:schemeClr val="accent1">
+                <a:shade val="50000"/>
+              </a:schemeClr>
+            </a:lnRef>
+            <a:fillRef idx="1">
+              <a:schemeClr val="accent1"/>
+            </a:fillRef>
+            <a:effectRef idx="0">
+              <a:schemeClr val="accent1"/>
+            </a:effectRef>
+            <a:fontRef idx="minor">
+              <a:schemeClr val="lt1"/>
+            </a:fontRef>
+          </p:style>
+          <p:txBody>
+            <a:bodyPr rtlCol="0" anchor="ctr"/>
+            <a:lstStyle/>
+            <a:p>
+              <a:pPr algn="ctr"/>
+              <a:endParaRPr lang="pt-BR"/>
+            </a:p>
+          </p:txBody>
+        </p:sp>
+        <p:sp>
+          <p:nvSpPr>
+            <p:cNvPr id="14" name="Retângulo 13"/>
+            <p:cNvSpPr/>
+            <p:nvPr/>
+          </p:nvSpPr>
+          <p:spPr>
+            <a:xfrm>
+              <a:off x="2235834" y="1395988"/>
+              <a:ext cx="486000" cy="392284"/>
+            </a:xfrm>
+            <a:prstGeom prst="rect">
+              <a:avLst/>
+            </a:prstGeom>
+            <a:noFill/>
+            <a:ln>
+              <a:solidFill>
+                <a:srgbClr val="FF0000"/>
+              </a:solidFill>
+            </a:ln>
+          </p:spPr>
+          <p:style>
+            <a:lnRef idx="2">
+              <a:schemeClr val="accent1">
+                <a:shade val="50000"/>
+              </a:schemeClr>
+            </a:lnRef>
+            <a:fillRef idx="1">
+              <a:schemeClr val="accent1"/>
+            </a:fillRef>
+            <a:effectRef idx="0">
+              <a:schemeClr val="accent1"/>
+            </a:effectRef>
+            <a:fontRef idx="minor">
+              <a:schemeClr val="lt1"/>
+            </a:fontRef>
+          </p:style>
+          <p:txBody>
+            <a:bodyPr rtlCol="0" anchor="ctr"/>
+            <a:lstStyle/>
+            <a:p>
+              <a:pPr algn="ctr"/>
+              <a:endParaRPr lang="pt-BR"/>
+            </a:p>
+          </p:txBody>
+        </p:sp>
+      </p:grpSp>
       <p:pic>
         <p:nvPicPr>
-          <p:cNvPr id="2" name="Imagem 1"/>
+          <p:cNvPr id="9" name="Imagem 8"/>
           <p:cNvPicPr>
             <a:picLocks noChangeAspect="1"/>
           </p:cNvPicPr>
@@ -4027,19 +4023,263 @@
               </a:ext>
             </a:extLst>
           </a:blip>
-          <a:srcRect t="3376"/>
+          <a:srcRect t="2014" b="5870"/>
           <a:stretch/>
         </p:blipFill>
         <p:spPr>
           <a:xfrm>
-            <a:off x="35496" y="44624"/>
-            <a:ext cx="4564321" cy="3420000"/>
+            <a:off x="5832504" y="3723663"/>
+            <a:ext cx="3276000" cy="3017705"/>
           </a:xfrm>
           <a:prstGeom prst="rect">
             <a:avLst/>
           </a:prstGeom>
         </p:spPr>
       </p:pic>
+      <p:sp>
+        <p:nvSpPr>
+          <p:cNvPr id="23" name="CaixaDeTexto 22"/>
+          <p:cNvSpPr txBox="1"/>
+          <p:nvPr/>
+        </p:nvSpPr>
+        <p:spPr>
+          <a:xfrm>
+            <a:off x="5023401" y="5811895"/>
+            <a:ext cx="1374094" cy="338554"/>
+          </a:xfrm>
+          <a:prstGeom prst="rect">
+            <a:avLst/>
+          </a:prstGeom>
+          <a:noFill/>
+        </p:spPr>
+        <p:txBody>
+          <a:bodyPr wrap="none" rtlCol="0">
+            <a:spAutoFit/>
+          </a:bodyPr>
+          <a:lstStyle/>
+          <a:p>
+            <a:r>
+              <a:rPr lang="pt-BR" sz="1600" dirty="0" smtClean="0"/>
+              <a:t>Campo Geom.</a:t>
+            </a:r>
+            <a:endParaRPr lang="pt-BR" sz="1600" dirty="0"/>
+          </a:p>
+        </p:txBody>
+      </p:sp>
+      <p:sp>
+        <p:nvSpPr>
+          <p:cNvPr id="24" name="Retângulo 23"/>
+          <p:cNvSpPr/>
+          <p:nvPr/>
+        </p:nvSpPr>
+        <p:spPr>
+          <a:xfrm rot="2700000">
+            <a:off x="4882400" y="6218868"/>
+            <a:ext cx="108000" cy="108000"/>
+          </a:xfrm>
+          <a:prstGeom prst="rect">
+            <a:avLst/>
+          </a:prstGeom>
+          <a:noFill/>
+          <a:ln>
+            <a:solidFill>
+              <a:srgbClr val="FF0000"/>
+            </a:solidFill>
+          </a:ln>
+        </p:spPr>
+        <p:style>
+          <a:lnRef idx="2">
+            <a:schemeClr val="accent1">
+              <a:shade val="50000"/>
+            </a:schemeClr>
+          </a:lnRef>
+          <a:fillRef idx="1">
+            <a:schemeClr val="accent1"/>
+          </a:fillRef>
+          <a:effectRef idx="0">
+            <a:schemeClr val="accent1"/>
+          </a:effectRef>
+          <a:fontRef idx="minor">
+            <a:schemeClr val="lt1"/>
+          </a:fontRef>
+        </p:style>
+        <p:txBody>
+          <a:bodyPr rtlCol="0" anchor="ctr"/>
+          <a:lstStyle/>
+          <a:p>
+            <a:pPr algn="ctr"/>
+            <a:endParaRPr lang="pt-BR"/>
+          </a:p>
+        </p:txBody>
+      </p:sp>
+      <p:sp>
+        <p:nvSpPr>
+          <p:cNvPr id="25" name="CaixaDeTexto 24"/>
+          <p:cNvSpPr txBox="1"/>
+          <p:nvPr/>
+        </p:nvSpPr>
+        <p:spPr>
+          <a:xfrm>
+            <a:off x="5023401" y="6089404"/>
+            <a:ext cx="1192121" cy="338554"/>
+          </a:xfrm>
+          <a:prstGeom prst="rect">
+            <a:avLst/>
+          </a:prstGeom>
+          <a:noFill/>
+        </p:spPr>
+        <p:txBody>
+          <a:bodyPr wrap="none" rtlCol="0">
+            <a:spAutoFit/>
+          </a:bodyPr>
+          <a:lstStyle/>
+          <a:p>
+            <a:r>
+              <a:rPr lang="pt-BR" sz="1600" dirty="0" smtClean="0">
+                <a:solidFill>
+                  <a:srgbClr val="FF0000"/>
+                </a:solidFill>
+              </a:rPr>
+              <a:t>Estimativa 1</a:t>
+            </a:r>
+            <a:endParaRPr lang="pt-BR" sz="1600" dirty="0">
+              <a:solidFill>
+                <a:srgbClr val="FF0000"/>
+              </a:solidFill>
+            </a:endParaRPr>
+          </a:p>
+        </p:txBody>
+      </p:sp>
+      <p:sp>
+        <p:nvSpPr>
+          <p:cNvPr id="26" name="Retângulo 25"/>
+          <p:cNvSpPr/>
+          <p:nvPr/>
+        </p:nvSpPr>
+        <p:spPr>
+          <a:xfrm>
+            <a:off x="4882400" y="6503091"/>
+            <a:ext cx="108000" cy="108000"/>
+          </a:xfrm>
+          <a:prstGeom prst="rect">
+            <a:avLst/>
+          </a:prstGeom>
+          <a:noFill/>
+          <a:ln>
+            <a:solidFill>
+              <a:srgbClr val="0000FF"/>
+            </a:solidFill>
+          </a:ln>
+        </p:spPr>
+        <p:style>
+          <a:lnRef idx="2">
+            <a:schemeClr val="accent1">
+              <a:shade val="50000"/>
+            </a:schemeClr>
+          </a:lnRef>
+          <a:fillRef idx="1">
+            <a:schemeClr val="accent1"/>
+          </a:fillRef>
+          <a:effectRef idx="0">
+            <a:schemeClr val="accent1"/>
+          </a:effectRef>
+          <a:fontRef idx="minor">
+            <a:schemeClr val="lt1"/>
+          </a:fontRef>
+        </p:style>
+        <p:txBody>
+          <a:bodyPr rtlCol="0" anchor="ctr"/>
+          <a:lstStyle/>
+          <a:p>
+            <a:pPr algn="ctr"/>
+            <a:endParaRPr lang="pt-BR"/>
+          </a:p>
+        </p:txBody>
+      </p:sp>
+      <p:sp>
+        <p:nvSpPr>
+          <p:cNvPr id="27" name="CaixaDeTexto 26"/>
+          <p:cNvSpPr txBox="1"/>
+          <p:nvPr/>
+        </p:nvSpPr>
+        <p:spPr>
+          <a:xfrm>
+            <a:off x="5023401" y="6366913"/>
+            <a:ext cx="1192121" cy="338554"/>
+          </a:xfrm>
+          <a:prstGeom prst="rect">
+            <a:avLst/>
+          </a:prstGeom>
+          <a:noFill/>
+        </p:spPr>
+        <p:txBody>
+          <a:bodyPr wrap="none" rtlCol="0">
+            <a:spAutoFit/>
+          </a:bodyPr>
+          <a:lstStyle/>
+          <a:p>
+            <a:r>
+              <a:rPr lang="pt-BR" sz="1600" dirty="0" smtClean="0">
+                <a:solidFill>
+                  <a:srgbClr val="0000FF"/>
+                </a:solidFill>
+              </a:rPr>
+              <a:t>Estimativa 2</a:t>
+            </a:r>
+            <a:endParaRPr lang="pt-BR" sz="1600" dirty="0">
+              <a:solidFill>
+                <a:srgbClr val="0000FF"/>
+              </a:solidFill>
+            </a:endParaRPr>
+          </a:p>
+        </p:txBody>
+      </p:sp>
+      <p:sp>
+        <p:nvSpPr>
+          <p:cNvPr id="29" name="Triângulo isósceles 28"/>
+          <p:cNvSpPr/>
+          <p:nvPr/>
+        </p:nvSpPr>
+        <p:spPr>
+          <a:xfrm>
+            <a:off x="4876630" y="5927450"/>
+            <a:ext cx="108000" cy="108000"/>
+          </a:xfrm>
+          <a:prstGeom prst="triangle">
+            <a:avLst/>
+          </a:prstGeom>
+          <a:noFill/>
+          <a:ln>
+            <a:solidFill>
+              <a:schemeClr val="tx1"/>
+            </a:solidFill>
+          </a:ln>
+        </p:spPr>
+        <p:style>
+          <a:lnRef idx="2">
+            <a:schemeClr val="accent1">
+              <a:shade val="50000"/>
+            </a:schemeClr>
+          </a:lnRef>
+          <a:fillRef idx="1">
+            <a:schemeClr val="accent1"/>
+          </a:fillRef>
+          <a:effectRef idx="0">
+            <a:schemeClr val="accent1"/>
+          </a:effectRef>
+          <a:fontRef idx="minor">
+            <a:schemeClr val="lt1"/>
+          </a:fontRef>
+        </p:style>
+        <p:txBody>
+          <a:bodyPr rtlCol="0" anchor="ctr"/>
+          <a:lstStyle/>
+          <a:p>
+            <a:pPr algn="ctr"/>
+            <a:endParaRPr lang="pt-BR"/>
+          </a:p>
+        </p:txBody>
+      </p:sp>
       <p:grpSp>
         <p:nvGrpSpPr>
           <p:cNvPr id="10" name="Grupo 9"/>
@@ -4285,98 +4525,6 @@
       </p:grpSp>
       <p:sp>
         <p:nvSpPr>
-          <p:cNvPr id="13" name="Retângulo 12"/>
-          <p:cNvSpPr/>
-          <p:nvPr/>
-        </p:nvSpPr>
-        <p:spPr>
-          <a:xfrm>
-            <a:off x="1259632" y="532778"/>
-            <a:ext cx="576064" cy="445145"/>
-          </a:xfrm>
-          <a:prstGeom prst="rect">
-            <a:avLst/>
-          </a:prstGeom>
-          <a:noFill/>
-          <a:ln>
-            <a:solidFill>
-              <a:srgbClr val="0000FF"/>
-            </a:solidFill>
-          </a:ln>
-        </p:spPr>
-        <p:style>
-          <a:lnRef idx="2">
-            <a:schemeClr val="accent1">
-              <a:shade val="50000"/>
-            </a:schemeClr>
-          </a:lnRef>
-          <a:fillRef idx="1">
-            <a:schemeClr val="accent1"/>
-          </a:fillRef>
-          <a:effectRef idx="0">
-            <a:schemeClr val="accent1"/>
-          </a:effectRef>
-          <a:fontRef idx="minor">
-            <a:schemeClr val="lt1"/>
-          </a:fontRef>
-        </p:style>
-        <p:txBody>
-          <a:bodyPr rtlCol="0" anchor="ctr"/>
-          <a:lstStyle/>
-          <a:p>
-            <a:pPr algn="ctr"/>
-            <a:endParaRPr lang="pt-BR"/>
-          </a:p>
-        </p:txBody>
-      </p:sp>
-      <p:sp>
-        <p:nvSpPr>
-          <p:cNvPr id="14" name="Retângulo 13"/>
-          <p:cNvSpPr/>
-          <p:nvPr/>
-        </p:nvSpPr>
-        <p:spPr>
-          <a:xfrm>
-            <a:off x="2507621" y="1147656"/>
-            <a:ext cx="576064" cy="458233"/>
-          </a:xfrm>
-          <a:prstGeom prst="rect">
-            <a:avLst/>
-          </a:prstGeom>
-          <a:noFill/>
-          <a:ln>
-            <a:solidFill>
-              <a:srgbClr val="FF0000"/>
-            </a:solidFill>
-          </a:ln>
-        </p:spPr>
-        <p:style>
-          <a:lnRef idx="2">
-            <a:schemeClr val="accent1">
-              <a:shade val="50000"/>
-            </a:schemeClr>
-          </a:lnRef>
-          <a:fillRef idx="1">
-            <a:schemeClr val="accent1"/>
-          </a:fillRef>
-          <a:effectRef idx="0">
-            <a:schemeClr val="accent1"/>
-          </a:effectRef>
-          <a:fontRef idx="minor">
-            <a:schemeClr val="lt1"/>
-          </a:fontRef>
-        </p:style>
-        <p:txBody>
-          <a:bodyPr rtlCol="0" anchor="ctr"/>
-          <a:lstStyle/>
-          <a:p>
-            <a:pPr algn="ctr"/>
-            <a:endParaRPr lang="pt-BR"/>
-          </a:p>
-        </p:txBody>
-      </p:sp>
-      <p:sp>
-        <p:nvSpPr>
           <p:cNvPr id="16" name="CaixaDeTexto 15"/>
           <p:cNvSpPr txBox="1"/>
           <p:nvPr/>
@@ -4570,6 +4718,36 @@
               <a:t>0°</a:t>
             </a:r>
             <a:endParaRPr lang="pt-BR" sz="1100" dirty="0"/>
+          </a:p>
+        </p:txBody>
+      </p:sp>
+      <p:sp>
+        <p:nvSpPr>
+          <p:cNvPr id="4" name="CaixaDeTexto 3"/>
+          <p:cNvSpPr txBox="1"/>
+          <p:nvPr/>
+        </p:nvSpPr>
+        <p:spPr>
+          <a:xfrm>
+            <a:off x="119130" y="41355"/>
+            <a:ext cx="3909063" cy="369332"/>
+          </a:xfrm>
+          <a:prstGeom prst="rect">
+            <a:avLst/>
+          </a:prstGeom>
+          <a:noFill/>
+        </p:spPr>
+        <p:txBody>
+          <a:bodyPr wrap="square" rtlCol="0">
+            <a:spAutoFit/>
+          </a:bodyPr>
+          <a:lstStyle/>
+          <a:p>
+            <a:r>
+              <a:rPr lang="pt-BR" dirty="0" smtClean="0"/>
+              <a:t>Aplicação na Província Alcalina de Goiás</a:t>
+            </a:r>
+            <a:endParaRPr lang="pt-BR" dirty="0"/>
           </a:p>
         </p:txBody>
       </p:sp>

</xml_diff>

<commit_message>
corrected version of the results with real data
</commit_message>
<xml_diff>
--- a/Manuscript/Resultados.pptx
+++ b/Manuscript/Resultados.pptx
@@ -3116,7 +3116,15 @@
           <a:p>
             <a:r>
               <a:rPr lang="pt-BR" dirty="0" smtClean="0"/>
-              <a:t>Determinação da direção de magnetização de corpo geológicos</a:t>
+              <a:t>Determinação da direção de magnetização de </a:t>
+            </a:r>
+            <a:r>
+              <a:rPr lang="pt-BR" dirty="0" smtClean="0"/>
+              <a:t>corpos </a:t>
+            </a:r>
+            <a:r>
+              <a:rPr lang="pt-BR" dirty="0" smtClean="0"/>
+              <a:t>geológicos</a:t>
             </a:r>
             <a:endParaRPr lang="pt-BR" dirty="0"/>
           </a:p>
@@ -3179,6 +3187,13 @@
   <p:clrMapOvr>
     <a:masterClrMapping/>
   </p:clrMapOvr>
+  <p:timing>
+    <p:tnLst>
+      <p:par>
+        <p:cTn id="1" dur="indefinite" restart="never" nodeType="tmRoot"/>
+      </p:par>
+    </p:tnLst>
+  </p:timing>
 </p:sld>
 </file>
 
@@ -4748,6 +4763,82 @@
               <a:t>Aplicação na Província Alcalina de Goiás</a:t>
             </a:r>
             <a:endParaRPr lang="pt-BR" dirty="0"/>
+          </a:p>
+        </p:txBody>
+      </p:sp>
+      <p:sp>
+        <p:nvSpPr>
+          <p:cNvPr id="31" name="CaixaDeTexto 30"/>
+          <p:cNvSpPr txBox="1"/>
+          <p:nvPr/>
+        </p:nvSpPr>
+        <p:spPr>
+          <a:xfrm>
+            <a:off x="2711418" y="1484118"/>
+            <a:ext cx="537327" cy="369332"/>
+          </a:xfrm>
+          <a:prstGeom prst="rect">
+            <a:avLst/>
+          </a:prstGeom>
+          <a:noFill/>
+        </p:spPr>
+        <p:txBody>
+          <a:bodyPr wrap="none" rtlCol="0">
+            <a:spAutoFit/>
+          </a:bodyPr>
+          <a:lstStyle/>
+          <a:p>
+            <a:r>
+              <a:rPr lang="pt-BR" dirty="0" smtClean="0">
+                <a:solidFill>
+                  <a:srgbClr val="FF0000"/>
+                </a:solidFill>
+              </a:rPr>
+              <a:t>DIO</a:t>
+            </a:r>
+            <a:endParaRPr lang="pt-BR" dirty="0">
+              <a:solidFill>
+                <a:srgbClr val="FF0000"/>
+              </a:solidFill>
+            </a:endParaRPr>
+          </a:p>
+        </p:txBody>
+      </p:sp>
+      <p:sp>
+        <p:nvSpPr>
+          <p:cNvPr id="33" name="CaixaDeTexto 32"/>
+          <p:cNvSpPr txBox="1"/>
+          <p:nvPr/>
+        </p:nvSpPr>
+        <p:spPr>
+          <a:xfrm>
+            <a:off x="493422" y="925972"/>
+            <a:ext cx="649088" cy="369332"/>
+          </a:xfrm>
+          <a:prstGeom prst="rect">
+            <a:avLst/>
+          </a:prstGeom>
+          <a:noFill/>
+        </p:spPr>
+        <p:txBody>
+          <a:bodyPr wrap="none" rtlCol="0">
+            <a:spAutoFit/>
+          </a:bodyPr>
+          <a:lstStyle/>
+          <a:p>
+            <a:r>
+              <a:rPr lang="pt-BR" dirty="0" smtClean="0">
+                <a:solidFill>
+                  <a:srgbClr val="0000FF"/>
+                </a:solidFill>
+              </a:rPr>
+              <a:t>MCG</a:t>
+            </a:r>
+            <a:endParaRPr lang="pt-BR" dirty="0">
+              <a:solidFill>
+                <a:srgbClr val="0000FF"/>
+              </a:solidFill>
+            </a:endParaRPr>
           </a:p>
         </p:txBody>
       </p:sp>

</xml_diff>